<commit_message>
Versione del caricamento dei dati migliorata.
</commit_message>
<xml_diff>
--- a/mhw2.pptx
+++ b/mhw2.pptx
@@ -6,15 +6,16 @@
   </p:sldMasterIdLst>
   <p:sldIdLst>
     <p:sldId id="256" r:id="rId2"/>
-    <p:sldId id="257" r:id="rId3"/>
-    <p:sldId id="259" r:id="rId4"/>
-    <p:sldId id="260" r:id="rId5"/>
-    <p:sldId id="261" r:id="rId6"/>
-    <p:sldId id="263" r:id="rId7"/>
-    <p:sldId id="264" r:id="rId8"/>
-    <p:sldId id="265" r:id="rId9"/>
-    <p:sldId id="266" r:id="rId10"/>
-    <p:sldId id="267" r:id="rId11"/>
+    <p:sldId id="268" r:id="rId3"/>
+    <p:sldId id="257" r:id="rId4"/>
+    <p:sldId id="259" r:id="rId5"/>
+    <p:sldId id="260" r:id="rId6"/>
+    <p:sldId id="261" r:id="rId7"/>
+    <p:sldId id="263" r:id="rId8"/>
+    <p:sldId id="264" r:id="rId9"/>
+    <p:sldId id="265" r:id="rId10"/>
+    <p:sldId id="266" r:id="rId11"/>
+    <p:sldId id="267" r:id="rId12"/>
   </p:sldIdLst>
   <p:sldSz cx="12192000" cy="6858000"/>
   <p:notesSz cx="6858000" cy="9144000"/>
@@ -121,6 +122,115 @@
 </p:presentation>
 </file>
 
+<file path=ppt/revisionInfo.xml><?xml version="1.0" encoding="utf-8"?>
+<p1510:revInfo xmlns:a="http://schemas.openxmlformats.org/drawingml/2006/main" xmlns:r="http://schemas.openxmlformats.org/officeDocument/2006/relationships" xmlns:p1510="http://schemas.microsoft.com/office/powerpoint/2015/10/main">
+  <p1510:revLst>
+    <p1510:client id="{F48A31E9-7CC8-CE43-9A9D-AA7E60A45FC5}" v="8" dt="2021-04-12T13:44:05.748"/>
+  </p1510:revLst>
+</p1510:revInfo>
+</file>
+
+<file path=ppt/changesInfos/changesInfo1.xml><?xml version="1.0" encoding="utf-8"?>
+<pc:chgInfo xmlns:a="http://schemas.openxmlformats.org/drawingml/2006/main" xmlns:r="http://schemas.openxmlformats.org/officeDocument/2006/relationships" xmlns:ac="http://schemas.microsoft.com/office/drawing/2013/main/command" xmlns:pc="http://schemas.microsoft.com/office/powerpoint/2013/main/command">
+  <pc:docChgLst>
+    <pc:chgData name="ENRICOMARIA DI ROSOLINI" userId="364fde89-c1da-4ea4-b773-7bda64acd2ce" providerId="ADAL" clId="{F48A31E9-7CC8-CE43-9A9D-AA7E60A45FC5}"/>
+    <pc:docChg chg="custSel addSld modSld">
+      <pc:chgData name="ENRICOMARIA DI ROSOLINI" userId="364fde89-c1da-4ea4-b773-7bda64acd2ce" providerId="ADAL" clId="{F48A31E9-7CC8-CE43-9A9D-AA7E60A45FC5}" dt="2021-04-12T13:46:11.565" v="516" actId="20577"/>
+      <pc:docMkLst>
+        <pc:docMk/>
+      </pc:docMkLst>
+      <pc:sldChg chg="addSp delSp modSp new mod">
+        <pc:chgData name="ENRICOMARIA DI ROSOLINI" userId="364fde89-c1da-4ea4-b773-7bda64acd2ce" providerId="ADAL" clId="{F48A31E9-7CC8-CE43-9A9D-AA7E60A45FC5}" dt="2021-04-12T13:46:11.565" v="516" actId="20577"/>
+        <pc:sldMkLst>
+          <pc:docMk/>
+          <pc:sldMk cId="227966244" sldId="268"/>
+        </pc:sldMkLst>
+        <pc:spChg chg="del">
+          <ac:chgData name="ENRICOMARIA DI ROSOLINI" userId="364fde89-c1da-4ea4-b773-7bda64acd2ce" providerId="ADAL" clId="{F48A31E9-7CC8-CE43-9A9D-AA7E60A45FC5}" dt="2021-04-12T12:54:37.333" v="2" actId="478"/>
+          <ac:spMkLst>
+            <pc:docMk/>
+            <pc:sldMk cId="227966244" sldId="268"/>
+            <ac:spMk id="2" creationId="{BB2DCB38-2ED1-F242-A946-2E75151D69F5}"/>
+          </ac:spMkLst>
+        </pc:spChg>
+        <pc:spChg chg="del">
+          <ac:chgData name="ENRICOMARIA DI ROSOLINI" userId="364fde89-c1da-4ea4-b773-7bda64acd2ce" providerId="ADAL" clId="{F48A31E9-7CC8-CE43-9A9D-AA7E60A45FC5}" dt="2021-04-12T12:54:39.070" v="3" actId="478"/>
+          <ac:spMkLst>
+            <pc:docMk/>
+            <pc:sldMk cId="227966244" sldId="268"/>
+            <ac:spMk id="3" creationId="{387C5E58-A524-2944-90AA-0F6988D24A3A}"/>
+          </ac:spMkLst>
+        </pc:spChg>
+        <pc:spChg chg="add mod">
+          <ac:chgData name="ENRICOMARIA DI ROSOLINI" userId="364fde89-c1da-4ea4-b773-7bda64acd2ce" providerId="ADAL" clId="{F48A31E9-7CC8-CE43-9A9D-AA7E60A45FC5}" dt="2021-04-12T12:54:48.633" v="30" actId="20577"/>
+          <ac:spMkLst>
+            <pc:docMk/>
+            <pc:sldMk cId="227966244" sldId="268"/>
+            <ac:spMk id="4" creationId="{903332B6-164D-3945-A2CE-9770F641EC68}"/>
+          </ac:spMkLst>
+        </pc:spChg>
+        <pc:spChg chg="add del mod">
+          <ac:chgData name="ENRICOMARIA DI ROSOLINI" userId="364fde89-c1da-4ea4-b773-7bda64acd2ce" providerId="ADAL" clId="{F48A31E9-7CC8-CE43-9A9D-AA7E60A45FC5}" dt="2021-04-12T13:43:00.409" v="108" actId="478"/>
+          <ac:spMkLst>
+            <pc:docMk/>
+            <pc:sldMk cId="227966244" sldId="268"/>
+            <ac:spMk id="7" creationId="{29324766-ADB4-4C44-8E0D-ACBD269C21DB}"/>
+          </ac:spMkLst>
+        </pc:spChg>
+        <pc:spChg chg="add del mod">
+          <ac:chgData name="ENRICOMARIA DI ROSOLINI" userId="364fde89-c1da-4ea4-b773-7bda64acd2ce" providerId="ADAL" clId="{F48A31E9-7CC8-CE43-9A9D-AA7E60A45FC5}" dt="2021-04-12T13:44:06.133" v="121"/>
+          <ac:spMkLst>
+            <pc:docMk/>
+            <pc:sldMk cId="227966244" sldId="268"/>
+            <ac:spMk id="10" creationId="{21CE1437-87E7-F640-BB8E-38452B98189C}"/>
+          </ac:spMkLst>
+        </pc:spChg>
+        <pc:spChg chg="add mod">
+          <ac:chgData name="ENRICOMARIA DI ROSOLINI" userId="364fde89-c1da-4ea4-b773-7bda64acd2ce" providerId="ADAL" clId="{F48A31E9-7CC8-CE43-9A9D-AA7E60A45FC5}" dt="2021-04-12T13:44:03.763" v="117" actId="767"/>
+          <ac:spMkLst>
+            <pc:docMk/>
+            <pc:sldMk cId="227966244" sldId="268"/>
+            <ac:spMk id="11" creationId="{A5F67F2E-7EB9-1944-8BFC-92D2B1BF1FDB}"/>
+          </ac:spMkLst>
+        </pc:spChg>
+        <pc:spChg chg="add mod">
+          <ac:chgData name="ENRICOMARIA DI ROSOLINI" userId="364fde89-c1da-4ea4-b773-7bda64acd2ce" providerId="ADAL" clId="{F48A31E9-7CC8-CE43-9A9D-AA7E60A45FC5}" dt="2021-04-12T13:44:04.265" v="118" actId="767"/>
+          <ac:spMkLst>
+            <pc:docMk/>
+            <pc:sldMk cId="227966244" sldId="268"/>
+            <ac:spMk id="12" creationId="{82C088A7-DE28-194E-8DED-58E92B6D9D82}"/>
+          </ac:spMkLst>
+        </pc:spChg>
+        <pc:spChg chg="add mod">
+          <ac:chgData name="ENRICOMARIA DI ROSOLINI" userId="364fde89-c1da-4ea4-b773-7bda64acd2ce" providerId="ADAL" clId="{F48A31E9-7CC8-CE43-9A9D-AA7E60A45FC5}" dt="2021-04-12T13:46:11.565" v="516" actId="20577"/>
+          <ac:spMkLst>
+            <pc:docMk/>
+            <pc:sldMk cId="227966244" sldId="268"/>
+            <ac:spMk id="13" creationId="{5BB685EB-978C-3044-B986-4BE6CE7C73F4}"/>
+          </ac:spMkLst>
+        </pc:spChg>
+        <pc:picChg chg="add del mod">
+          <ac:chgData name="ENRICOMARIA DI ROSOLINI" userId="364fde89-c1da-4ea4-b773-7bda64acd2ce" providerId="ADAL" clId="{F48A31E9-7CC8-CE43-9A9D-AA7E60A45FC5}" dt="2021-04-12T13:43:56.225" v="110" actId="478"/>
+          <ac:picMkLst>
+            <pc:docMk/>
+            <pc:sldMk cId="227966244" sldId="268"/>
+            <ac:picMk id="6" creationId="{72C16779-152C-684A-89A1-8A58A74D4482}"/>
+          </ac:picMkLst>
+        </pc:picChg>
+        <pc:picChg chg="add mod">
+          <ac:chgData name="ENRICOMARIA DI ROSOLINI" userId="364fde89-c1da-4ea4-b773-7bda64acd2ce" providerId="ADAL" clId="{F48A31E9-7CC8-CE43-9A9D-AA7E60A45FC5}" dt="2021-04-12T13:44:00.948" v="115" actId="1076"/>
+          <ac:picMkLst>
+            <pc:docMk/>
+            <pc:sldMk cId="227966244" sldId="268"/>
+            <ac:picMk id="9" creationId="{02B67F19-E7B9-BD47-8307-B11B41B15346}"/>
+          </ac:picMkLst>
+        </pc:picChg>
+      </pc:sldChg>
+    </pc:docChg>
+  </pc:docChgLst>
+</pc:chgInfo>
+</file>
+
 <file path=ppt/slideLayouts/slideLayout1.xml><?xml version="1.0" encoding="utf-8"?>
 <p:sldLayout xmlns:a="http://schemas.openxmlformats.org/drawingml/2006/main" xmlns:r="http://schemas.openxmlformats.org/officeDocument/2006/relationships" xmlns:p="http://schemas.openxmlformats.org/presentationml/2006/main" type="title" preserve="1">
   <p:cSld name="Title Slide">
@@ -685,7 +795,7 @@
           <a:p>
             <a:fld id="{D6D0F569-AC90-44EB-9EF4-4E5C2F5D823C}" type="datetime1">
               <a:rPr lang="en-US" smtClean="0"/>
-              <a:t>4/9/21</a:t>
+              <a:t>4/12/21</a:t>
             </a:fld>
             <a:endParaRPr lang="en-US" dirty="0"/>
           </a:p>
@@ -1362,7 +1472,7 @@
           <a:p>
             <a:fld id="{46BA7D41-E8B7-4A0B-B861-3EC4AE88917D}" type="datetime1">
               <a:rPr lang="en-US" smtClean="0"/>
-              <a:t>4/9/21</a:t>
+              <a:t>4/12/21</a:t>
             </a:fld>
             <a:endParaRPr lang="en-US" dirty="0"/>
           </a:p>
@@ -2049,7 +2159,7 @@
           <a:p>
             <a:fld id="{A7C34823-0B19-4B4E-A643-7A3B0A3D24D6}" type="datetime1">
               <a:rPr lang="en-US" smtClean="0"/>
-              <a:t>4/9/21</a:t>
+              <a:t>4/12/21</a:t>
             </a:fld>
             <a:endParaRPr lang="en-US" dirty="0"/>
           </a:p>
@@ -2729,7 +2839,7 @@
           <a:p>
             <a:fld id="{8C2D79EF-17C8-45D8-9866-DAF5723FC604}" type="datetime1">
               <a:rPr lang="en-US" smtClean="0"/>
-              <a:t>4/9/21</a:t>
+              <a:t>4/12/21</a:t>
             </a:fld>
             <a:endParaRPr lang="en-US" dirty="0"/>
           </a:p>
@@ -3483,7 +3593,7 @@
           <a:p>
             <a:fld id="{DFFC2ADC-3680-4013-A757-E4663495DB98}" type="datetime1">
               <a:rPr lang="en-US" smtClean="0"/>
-              <a:t>4/9/21</a:t>
+              <a:t>4/12/21</a:t>
             </a:fld>
             <a:endParaRPr lang="en-US" dirty="0"/>
           </a:p>
@@ -4227,7 +4337,7 @@
           <a:p>
             <a:fld id="{4751BA94-5DCA-4F19-960F-0FB2BD5EE85A}" type="datetime1">
               <a:rPr lang="en-US" smtClean="0"/>
-              <a:t>4/9/21</a:t>
+              <a:t>4/12/21</a:t>
             </a:fld>
             <a:endParaRPr lang="en-US" dirty="0"/>
           </a:p>
@@ -5118,7 +5228,7 @@
           <a:p>
             <a:fld id="{01BED947-38D9-44AC-8B89-E79758333B77}" type="datetime1">
               <a:rPr lang="en-US" smtClean="0"/>
-              <a:t>4/9/21</a:t>
+              <a:t>4/12/21</a:t>
             </a:fld>
             <a:endParaRPr lang="en-US" dirty="0"/>
           </a:p>
@@ -5738,7 +5848,7 @@
           <a:p>
             <a:fld id="{3781E23F-BD3C-4F23-B116-2B758120C8AC}" type="datetime1">
               <a:rPr lang="en-US" smtClean="0"/>
-              <a:t>4/9/21</a:t>
+              <a:t>4/12/21</a:t>
             </a:fld>
             <a:endParaRPr lang="en-US" dirty="0"/>
           </a:p>
@@ -6330,7 +6440,7 @@
           <a:p>
             <a:fld id="{473CFAA9-6D59-4D98-869E-ACBDB83B2CA4}" type="datetime1">
               <a:rPr lang="en-US" smtClean="0"/>
-              <a:t>4/9/21</a:t>
+              <a:t>4/12/21</a:t>
             </a:fld>
             <a:endParaRPr lang="en-US"/>
           </a:p>
@@ -7120,7 +7230,7 @@
           <a:p>
             <a:fld id="{DC410804-27E3-430A-BB42-B831260DE39A}" type="datetime1">
               <a:rPr lang="en-US" smtClean="0"/>
-              <a:t>4/9/21</a:t>
+              <a:t>4/12/21</a:t>
             </a:fld>
             <a:endParaRPr lang="en-US" dirty="0"/>
           </a:p>
@@ -7890,7 +8000,7 @@
           <a:p>
             <a:fld id="{60E22DE3-3D1A-4D53-B9A6-6C7463B8C992}" type="datetime1">
               <a:rPr lang="en-US" smtClean="0"/>
-              <a:t>4/9/21</a:t>
+              <a:t>4/12/21</a:t>
             </a:fld>
             <a:endParaRPr lang="en-US" dirty="0"/>
           </a:p>
@@ -8199,7 +8309,7 @@
             <a:fld id="{5ECD8B30-1B71-45A1-8314-D59C86F581E1}" type="datetime1">
               <a:rPr lang="en-US" smtClean="0"/>
               <a:pPr/>
-              <a:t>4/9/21</a:t>
+              <a:t>4/12/21</a:t>
             </a:fld>
             <a:endParaRPr lang="en-US" b="1" dirty="0"/>
           </a:p>
@@ -9572,6 +9682,146 @@
           <a:chExt cx="0" cy="0"/>
         </a:xfrm>
       </p:grpSpPr>
+      <p:sp>
+        <p:nvSpPr>
+          <p:cNvPr id="2" name="CasellaDiTesto 1">
+            <a:extLst>
+              <a:ext uri="{FF2B5EF4-FFF2-40B4-BE49-F238E27FC236}">
+                <a16:creationId xmlns:a16="http://schemas.microsoft.com/office/drawing/2014/main" id="{376D5032-7818-2D43-BCA4-B6F92A338EAB}"/>
+              </a:ext>
+            </a:extLst>
+          </p:cNvPr>
+          <p:cNvSpPr txBox="1"/>
+          <p:nvPr/>
+        </p:nvSpPr>
+        <p:spPr>
+          <a:xfrm>
+            <a:off x="777766" y="472966"/>
+            <a:ext cx="11414234" cy="769441"/>
+          </a:xfrm>
+          <a:prstGeom prst="rect">
+            <a:avLst/>
+          </a:prstGeom>
+          <a:noFill/>
+        </p:spPr>
+        <p:txBody>
+          <a:bodyPr wrap="square" rtlCol="0">
+            <a:spAutoFit/>
+          </a:bodyPr>
+          <a:lstStyle/>
+          <a:p>
+            <a:r>
+              <a:rPr lang="it-IT" sz="4400" b="1" dirty="0">
+                <a:latin typeface="Aharoni" panose="02010803020104030203" pitchFamily="2" charset="-79"/>
+                <a:cs typeface="Aharoni" panose="02010803020104030203" pitchFamily="2" charset="-79"/>
+              </a:rPr>
+              <a:t>Barra di ricerca - </a:t>
+            </a:r>
+            <a:r>
+              <a:rPr lang="it-IT" sz="3200" b="1" dirty="0">
+                <a:latin typeface="Aharoni" panose="02010803020104030203" pitchFamily="2" charset="-79"/>
+                <a:cs typeface="Aharoni" panose="02010803020104030203" pitchFamily="2" charset="-79"/>
+              </a:rPr>
+              <a:t>Ripristino</a:t>
+            </a:r>
+          </a:p>
+        </p:txBody>
+      </p:sp>
+      <p:pic>
+        <p:nvPicPr>
+          <p:cNvPr id="6" name="Immagine 5" descr="Immagine che contiene testo&#10;&#10;Descrizione generata automaticamente">
+            <a:extLst>
+              <a:ext uri="{FF2B5EF4-FFF2-40B4-BE49-F238E27FC236}">
+                <a16:creationId xmlns:a16="http://schemas.microsoft.com/office/drawing/2014/main" id="{2B9009F9-D549-3B48-9B93-6E69D60CC772}"/>
+              </a:ext>
+            </a:extLst>
+          </p:cNvPr>
+          <p:cNvPicPr>
+            <a:picLocks noChangeAspect="1"/>
+          </p:cNvPicPr>
+          <p:nvPr/>
+        </p:nvPicPr>
+        <p:blipFill>
+          <a:blip r:embed="rId2"/>
+          <a:stretch>
+            <a:fillRect/>
+          </a:stretch>
+        </p:blipFill>
+        <p:spPr>
+          <a:xfrm>
+            <a:off x="377716" y="1482228"/>
+            <a:ext cx="6527800" cy="1587500"/>
+          </a:xfrm>
+          <a:prstGeom prst="rect">
+            <a:avLst/>
+          </a:prstGeom>
+        </p:spPr>
+      </p:pic>
+      <p:sp>
+        <p:nvSpPr>
+          <p:cNvPr id="7" name="CasellaDiTesto 6">
+            <a:extLst>
+              <a:ext uri="{FF2B5EF4-FFF2-40B4-BE49-F238E27FC236}">
+                <a16:creationId xmlns:a16="http://schemas.microsoft.com/office/drawing/2014/main" id="{6A47DF3F-99D3-F345-84F6-72FAFEFAF671}"/>
+              </a:ext>
+            </a:extLst>
+          </p:cNvPr>
+          <p:cNvSpPr txBox="1"/>
+          <p:nvPr/>
+        </p:nvSpPr>
+        <p:spPr>
+          <a:xfrm>
+            <a:off x="185738" y="3449635"/>
+            <a:ext cx="11772900" cy="369332"/>
+          </a:xfrm>
+          <a:prstGeom prst="rect">
+            <a:avLst/>
+          </a:prstGeom>
+          <a:noFill/>
+        </p:spPr>
+        <p:txBody>
+          <a:bodyPr wrap="square" rtlCol="0">
+            <a:spAutoFit/>
+          </a:bodyPr>
+          <a:lstStyle/>
+          <a:p>
+            <a:r>
+              <a:rPr lang="it-IT" dirty="0"/>
+              <a:t>Un semplice script in cui mi ripristina gli elementi nella loro posizione «naturale»</a:t>
+            </a:r>
+          </a:p>
+        </p:txBody>
+      </p:sp>
+    </p:spTree>
+    <p:extLst>
+      <p:ext uri="{BB962C8B-B14F-4D97-AF65-F5344CB8AC3E}">
+        <p14:creationId xmlns:p14="http://schemas.microsoft.com/office/powerpoint/2010/main" val="1185359177"/>
+      </p:ext>
+    </p:extLst>
+  </p:cSld>
+  <p:clrMapOvr>
+    <a:masterClrMapping/>
+  </p:clrMapOvr>
+</p:sld>
+</file>
+
+<file path=ppt/slides/slide11.xml><?xml version="1.0" encoding="utf-8"?>
+<p:sld xmlns:a="http://schemas.openxmlformats.org/drawingml/2006/main" xmlns:r="http://schemas.openxmlformats.org/officeDocument/2006/relationships" xmlns:p="http://schemas.openxmlformats.org/presentationml/2006/main">
+  <p:cSld>
+    <p:spTree>
+      <p:nvGrpSpPr>
+        <p:cNvPr id="1" name=""/>
+        <p:cNvGrpSpPr/>
+        <p:nvPr/>
+      </p:nvGrpSpPr>
+      <p:grpSpPr>
+        <a:xfrm>
+          <a:off x="0" y="0"/>
+          <a:ext cx="0" cy="0"/>
+          <a:chOff x="0" y="0"/>
+          <a:chExt cx="0" cy="0"/>
+        </a:xfrm>
+      </p:grpSpPr>
       <p:pic>
         <p:nvPicPr>
           <p:cNvPr id="5" name="Segnaposto contenuto 4" descr="Immagine che contiene testo&#10;&#10;Descrizione generata automaticamente">
@@ -9732,10 +9982,10 @@
       </p:grpSpPr>
       <p:sp>
         <p:nvSpPr>
-          <p:cNvPr id="2" name="CasellaDiTesto 1">
-            <a:extLst>
-              <a:ext uri="{FF2B5EF4-FFF2-40B4-BE49-F238E27FC236}">
-                <a16:creationId xmlns:a16="http://schemas.microsoft.com/office/drawing/2014/main" id="{376D5032-7818-2D43-BCA4-B6F92A338EAB}"/>
+          <p:cNvPr id="4" name="CasellaDiTesto 3">
+            <a:extLst>
+              <a:ext uri="{FF2B5EF4-FFF2-40B4-BE49-F238E27FC236}">
+                <a16:creationId xmlns:a16="http://schemas.microsoft.com/office/drawing/2014/main" id="{903332B6-164D-3945-A2CE-9770F641EC68}"/>
               </a:ext>
             </a:extLst>
           </p:cNvPr>
@@ -9745,7 +9995,7 @@
         <p:spPr>
           <a:xfrm>
             <a:off x="777766" y="472966"/>
-            <a:ext cx="6032421" cy="769441"/>
+            <a:ext cx="7226658" cy="769441"/>
           </a:xfrm>
           <a:prstGeom prst="rect">
             <a:avLst/>
@@ -9763,17 +10013,17 @@
                 <a:latin typeface="Aharoni" panose="02010803020104030203" pitchFamily="2" charset="-79"/>
                 <a:cs typeface="Aharoni" panose="02010803020104030203" pitchFamily="2" charset="-79"/>
               </a:rPr>
-              <a:t>Selezione dei preferiti</a:t>
+              <a:t>Caricamento dei contenuti</a:t>
             </a:r>
           </a:p>
         </p:txBody>
       </p:sp>
       <p:pic>
         <p:nvPicPr>
-          <p:cNvPr id="5" name="Immagine 4" descr="Immagine che contiene testo&#10;&#10;Descrizione generata automaticamente">
-            <a:extLst>
-              <a:ext uri="{FF2B5EF4-FFF2-40B4-BE49-F238E27FC236}">
-                <a16:creationId xmlns:a16="http://schemas.microsoft.com/office/drawing/2014/main" id="{F6201D79-B452-3A49-B506-392B57DB7A89}"/>
+          <p:cNvPr id="9" name="Immagine 8" descr="Immagine che contiene testo&#10;&#10;Descrizione generata automaticamente">
+            <a:extLst>
+              <a:ext uri="{FF2B5EF4-FFF2-40B4-BE49-F238E27FC236}">
+                <a16:creationId xmlns:a16="http://schemas.microsoft.com/office/drawing/2014/main" id="{02B67F19-E7B9-BD47-8307-B11B41B15346}"/>
               </a:ext>
             </a:extLst>
           </p:cNvPr>
@@ -9790,8 +10040,8 @@
         </p:blipFill>
         <p:spPr>
           <a:xfrm>
-            <a:off x="307787" y="1627352"/>
-            <a:ext cx="6502400" cy="1879600"/>
+            <a:off x="616791" y="1085850"/>
+            <a:ext cx="3185320" cy="5600700"/>
           </a:xfrm>
           <a:prstGeom prst="rect">
             <a:avLst/>
@@ -9800,10 +10050,10 @@
       </p:pic>
       <p:sp>
         <p:nvSpPr>
-          <p:cNvPr id="7" name="CasellaDiTesto 6">
-            <a:extLst>
-              <a:ext uri="{FF2B5EF4-FFF2-40B4-BE49-F238E27FC236}">
-                <a16:creationId xmlns:a16="http://schemas.microsoft.com/office/drawing/2014/main" id="{F30E502F-4489-1A4C-9DE1-606599A551C9}"/>
+          <p:cNvPr id="11" name="CasellaDiTesto 10">
+            <a:extLst>
+              <a:ext uri="{FF2B5EF4-FFF2-40B4-BE49-F238E27FC236}">
+                <a16:creationId xmlns:a16="http://schemas.microsoft.com/office/drawing/2014/main" id="{A5F67F2E-7EB9-1944-8BFC-92D2B1BF1FDB}"/>
               </a:ext>
             </a:extLst>
           </p:cNvPr>
@@ -9812,8 +10062,72 @@
         </p:nvSpPr>
         <p:spPr>
           <a:xfrm>
-            <a:off x="7015163" y="1714500"/>
-            <a:ext cx="4869049" cy="1754326"/>
+            <a:off x="7472363" y="1443038"/>
+            <a:ext cx="184731" cy="369332"/>
+          </a:xfrm>
+          <a:prstGeom prst="rect">
+            <a:avLst/>
+          </a:prstGeom>
+          <a:noFill/>
+        </p:spPr>
+        <p:txBody>
+          <a:bodyPr wrap="none" rtlCol="0">
+            <a:spAutoFit/>
+          </a:bodyPr>
+          <a:lstStyle/>
+          <a:p>
+            <a:endParaRPr lang="it-IT" dirty="0"/>
+          </a:p>
+        </p:txBody>
+      </p:sp>
+      <p:sp>
+        <p:nvSpPr>
+          <p:cNvPr id="12" name="CasellaDiTesto 11">
+            <a:extLst>
+              <a:ext uri="{FF2B5EF4-FFF2-40B4-BE49-F238E27FC236}">
+                <a16:creationId xmlns:a16="http://schemas.microsoft.com/office/drawing/2014/main" id="{82C088A7-DE28-194E-8DED-58E92B6D9D82}"/>
+              </a:ext>
+            </a:extLst>
+          </p:cNvPr>
+          <p:cNvSpPr txBox="1"/>
+          <p:nvPr/>
+        </p:nvSpPr>
+        <p:spPr>
+          <a:xfrm>
+            <a:off x="8215313" y="1600200"/>
+            <a:ext cx="184731" cy="369332"/>
+          </a:xfrm>
+          <a:prstGeom prst="rect">
+            <a:avLst/>
+          </a:prstGeom>
+          <a:noFill/>
+        </p:spPr>
+        <p:txBody>
+          <a:bodyPr wrap="none" rtlCol="0">
+            <a:spAutoFit/>
+          </a:bodyPr>
+          <a:lstStyle/>
+          <a:p>
+            <a:endParaRPr lang="it-IT" dirty="0"/>
+          </a:p>
+        </p:txBody>
+      </p:sp>
+      <p:sp>
+        <p:nvSpPr>
+          <p:cNvPr id="13" name="CasellaDiTesto 12">
+            <a:extLst>
+              <a:ext uri="{FF2B5EF4-FFF2-40B4-BE49-F238E27FC236}">
+                <a16:creationId xmlns:a16="http://schemas.microsoft.com/office/drawing/2014/main" id="{5BB685EB-978C-3044-B986-4BE6CE7C73F4}"/>
+              </a:ext>
+            </a:extLst>
+          </p:cNvPr>
+          <p:cNvSpPr txBox="1"/>
+          <p:nvPr/>
+        </p:nvSpPr>
+        <p:spPr>
+          <a:xfrm>
+            <a:off x="4129088" y="1514474"/>
+            <a:ext cx="7829550" cy="1200329"/>
           </a:xfrm>
           <a:prstGeom prst="rect">
             <a:avLst/>
@@ -9828,56 +10142,28 @@
           <a:p>
             <a:r>
               <a:rPr lang="it-IT" dirty="0"/>
-              <a:t>Per prima cosa vado a prendermi il div dove andremo a mettere gli elementi che saranno preferiti dall’utente.</a:t>
-            </a:r>
-          </a:p>
-          <a:p>
+              <a:t>Per il caricamento dei contenuti, ho pensato di attuare un ciclo for in cui fino a un certo punto l’algoritmo crea lo stesso tipo di contenitore ma, per la diversità dello stile e delle immagini di ogni articolo, successivamente tramite un </a:t>
+            </a:r>
+            <a:r>
+              <a:rPr lang="it-IT" dirty="0" err="1"/>
+              <a:t>if</a:t>
+            </a:r>
             <a:r>
               <a:rPr lang="it-IT" dirty="0"/>
-              <a:t>Successivamente ho preso tutti i div che corrispondono ai «bottoni» dove andremo a cliccare per inserire l’articolo tra i preferiti.</a:t>
-            </a:r>
-          </a:p>
-        </p:txBody>
-      </p:sp>
-      <p:sp>
-        <p:nvSpPr>
-          <p:cNvPr id="8" name="CasellaDiTesto 7">
-            <a:extLst>
-              <a:ext uri="{FF2B5EF4-FFF2-40B4-BE49-F238E27FC236}">
-                <a16:creationId xmlns:a16="http://schemas.microsoft.com/office/drawing/2014/main" id="{2ADB7204-19AE-204F-98A2-9138AD2AD2C0}"/>
-              </a:ext>
-            </a:extLst>
-          </p:cNvPr>
-          <p:cNvSpPr txBox="1"/>
-          <p:nvPr/>
-        </p:nvSpPr>
-        <p:spPr>
-          <a:xfrm>
-            <a:off x="257175" y="3957636"/>
-            <a:ext cx="11524922" cy="646331"/>
-          </a:xfrm>
-          <a:prstGeom prst="rect">
-            <a:avLst/>
-          </a:prstGeom>
-          <a:noFill/>
-        </p:spPr>
-        <p:txBody>
-          <a:bodyPr wrap="square" rtlCol="0">
-            <a:spAutoFit/>
-          </a:bodyPr>
-          <a:lstStyle/>
-          <a:p>
-            <a:r>
-              <a:rPr lang="it-IT" dirty="0"/>
-              <a:t>A quest’ultimi vado ad aggiungere un evento di tipo «click», che farà partire lo script per poterlo mettere nella sezione preferita. </a:t>
-            </a:r>
+              <a:t> il tutto viene messo secondo la </a:t>
+            </a:r>
+            <a:r>
+              <a:rPr lang="it-IT"/>
+              <a:t>disposizione scelta da me.</a:t>
+            </a:r>
+            <a:endParaRPr lang="it-IT" dirty="0"/>
           </a:p>
         </p:txBody>
       </p:sp>
     </p:spTree>
     <p:extLst>
       <p:ext uri="{BB962C8B-B14F-4D97-AF65-F5344CB8AC3E}">
-        <p14:creationId xmlns:p14="http://schemas.microsoft.com/office/powerpoint/2010/main" val="2158156828"/>
+        <p14:creationId xmlns:p14="http://schemas.microsoft.com/office/powerpoint/2010/main" val="227966244"/>
       </p:ext>
     </p:extLst>
   </p:cSld>
@@ -9919,7 +10205,7 @@
         <p:spPr>
           <a:xfrm>
             <a:off x="777766" y="472966"/>
-            <a:ext cx="8297464" cy="769441"/>
+            <a:ext cx="6032421" cy="769441"/>
           </a:xfrm>
           <a:prstGeom prst="rect">
             <a:avLst/>
@@ -9937,24 +10223,17 @@
                 <a:latin typeface="Aharoni" panose="02010803020104030203" pitchFamily="2" charset="-79"/>
                 <a:cs typeface="Aharoni" panose="02010803020104030203" pitchFamily="2" charset="-79"/>
               </a:rPr>
-              <a:t>Selezione dei preferiti - </a:t>
-            </a:r>
-            <a:r>
-              <a:rPr lang="it-IT" sz="3200" b="1" dirty="0">
-                <a:latin typeface="Aharoni" panose="02010803020104030203" pitchFamily="2" charset="-79"/>
-                <a:cs typeface="Aharoni" panose="02010803020104030203" pitchFamily="2" charset="-79"/>
-              </a:rPr>
-              <a:t>Aggiunta</a:t>
+              <a:t>Selezione dei preferiti</a:t>
             </a:r>
           </a:p>
         </p:txBody>
       </p:sp>
       <p:pic>
         <p:nvPicPr>
-          <p:cNvPr id="4" name="Immagine 3" descr="Immagine che contiene testo&#10;&#10;Descrizione generata automaticamente">
-            <a:extLst>
-              <a:ext uri="{FF2B5EF4-FFF2-40B4-BE49-F238E27FC236}">
-                <a16:creationId xmlns:a16="http://schemas.microsoft.com/office/drawing/2014/main" id="{58ED23DB-59CA-FF40-883F-16A4CFDA0D0F}"/>
+          <p:cNvPr id="5" name="Immagine 4" descr="Immagine che contiene testo&#10;&#10;Descrizione generata automaticamente">
+            <a:extLst>
+              <a:ext uri="{FF2B5EF4-FFF2-40B4-BE49-F238E27FC236}">
+                <a16:creationId xmlns:a16="http://schemas.microsoft.com/office/drawing/2014/main" id="{F6201D79-B452-3A49-B506-392B57DB7A89}"/>
               </a:ext>
             </a:extLst>
           </p:cNvPr>
@@ -9971,8 +10250,8 @@
         </p:blipFill>
         <p:spPr>
           <a:xfrm>
-            <a:off x="245680" y="1242407"/>
-            <a:ext cx="6355145" cy="4378717"/>
+            <a:off x="307787" y="1627352"/>
+            <a:ext cx="6502400" cy="1879600"/>
           </a:xfrm>
           <a:prstGeom prst="rect">
             <a:avLst/>
@@ -9981,10 +10260,10 @@
       </p:pic>
       <p:sp>
         <p:nvSpPr>
-          <p:cNvPr id="6" name="CasellaDiTesto 5">
-            <a:extLst>
-              <a:ext uri="{FF2B5EF4-FFF2-40B4-BE49-F238E27FC236}">
-                <a16:creationId xmlns:a16="http://schemas.microsoft.com/office/drawing/2014/main" id="{983D3BE6-AC13-A246-AED9-D6D3538E89C2}"/>
+          <p:cNvPr id="7" name="CasellaDiTesto 6">
+            <a:extLst>
+              <a:ext uri="{FF2B5EF4-FFF2-40B4-BE49-F238E27FC236}">
+                <a16:creationId xmlns:a16="http://schemas.microsoft.com/office/drawing/2014/main" id="{F30E502F-4489-1A4C-9DE1-606599A551C9}"/>
               </a:ext>
             </a:extLst>
           </p:cNvPr>
@@ -9993,8 +10272,8 @@
         </p:nvSpPr>
         <p:spPr>
           <a:xfrm>
-            <a:off x="6810187" y="1343024"/>
-            <a:ext cx="5136133" cy="4247317"/>
+            <a:off x="7015163" y="1714500"/>
+            <a:ext cx="4869049" cy="1754326"/>
           </a:xfrm>
           <a:prstGeom prst="rect">
             <a:avLst/>
@@ -10009,29 +10288,48 @@
           <a:p>
             <a:r>
               <a:rPr lang="it-IT" dirty="0"/>
-              <a:t>La funzione, per prima cosa, controlla se l’articolo in cui abbiamo cliccato sul div preferiti fa già parte di una lista in cui tengo conto quali articoli sono stati aggiunti nella sezione dei preferiti. Ovviamente se l’articolo non si trova nella lista, entra dentro il blocco else. Nel blocco else viene aggiunto appunto nella lista degli elementi aggiunti e dato che, da specifica, l’articolo deve pur rimanere nella sezione dove ci stanno tutti gli articoli e quindi mi clono l’articolo e, in quest’ultimo,  rimuovo l’evento </a:t>
-            </a:r>
-            <a:r>
-              <a:rPr lang="it-IT" dirty="0" err="1"/>
-              <a:t>addSezionePreferiti</a:t>
-            </a:r>
+              <a:t>Per prima cosa vado a prendermi il div dove andremo a mettere gli elementi che saranno preferiti dall’utente.</a:t>
+            </a:r>
+          </a:p>
+          <a:p>
             <a:r>
               <a:rPr lang="it-IT" dirty="0"/>
-              <a:t> mentre aggiungo un nuovo evento «esclusivo» per poterli togliere dalla sezione dei preferiti.</a:t>
-            </a:r>
-          </a:p>
+              <a:t>Successivamente ho preso tutti i div che corrispondono ai «bottoni» dove andremo a cliccare per inserire l’articolo tra i preferiti.</a:t>
+            </a:r>
+          </a:p>
+        </p:txBody>
+      </p:sp>
+      <p:sp>
+        <p:nvSpPr>
+          <p:cNvPr id="8" name="CasellaDiTesto 7">
+            <a:extLst>
+              <a:ext uri="{FF2B5EF4-FFF2-40B4-BE49-F238E27FC236}">
+                <a16:creationId xmlns:a16="http://schemas.microsoft.com/office/drawing/2014/main" id="{2ADB7204-19AE-204F-98A2-9138AD2AD2C0}"/>
+              </a:ext>
+            </a:extLst>
+          </p:cNvPr>
+          <p:cNvSpPr txBox="1"/>
+          <p:nvPr/>
+        </p:nvSpPr>
+        <p:spPr>
+          <a:xfrm>
+            <a:off x="257175" y="3957636"/>
+            <a:ext cx="11524922" cy="646331"/>
+          </a:xfrm>
+          <a:prstGeom prst="rect">
+            <a:avLst/>
+          </a:prstGeom>
+          <a:noFill/>
+        </p:spPr>
+        <p:txBody>
+          <a:bodyPr wrap="square" rtlCol="0">
+            <a:spAutoFit/>
+          </a:bodyPr>
+          <a:lstStyle/>
           <a:p>
             <a:r>
               <a:rPr lang="it-IT" dirty="0"/>
-              <a:t>Appena finito di sistemare il clone, lo metto nella sezione preferiti tramite l’</a:t>
-            </a:r>
-            <a:r>
-              <a:rPr lang="it-IT" dirty="0" err="1"/>
-              <a:t>appendChild</a:t>
-            </a:r>
-            <a:r>
-              <a:rPr lang="it-IT" dirty="0"/>
-              <a:t>.</a:t>
+              <a:t>A quest’ultimi vado ad aggiungere un evento di tipo «click», che farà partire lo script per poterlo mettere nella sezione preferita. </a:t>
             </a:r>
           </a:p>
         </p:txBody>
@@ -10039,7 +10337,7 @@
     </p:spTree>
     <p:extLst>
       <p:ext uri="{BB962C8B-B14F-4D97-AF65-F5344CB8AC3E}">
-        <p14:creationId xmlns:p14="http://schemas.microsoft.com/office/powerpoint/2010/main" val="4228455434"/>
+        <p14:creationId xmlns:p14="http://schemas.microsoft.com/office/powerpoint/2010/main" val="2158156828"/>
       </p:ext>
     </p:extLst>
   </p:cSld>
@@ -10081,7 +10379,7 @@
         <p:spPr>
           <a:xfrm>
             <a:off x="777766" y="472966"/>
-            <a:ext cx="8715848" cy="769441"/>
+            <a:ext cx="8297464" cy="769441"/>
           </a:xfrm>
           <a:prstGeom prst="rect">
             <a:avLst/>
@@ -10099,24 +10397,24 @@
                 <a:latin typeface="Aharoni" panose="02010803020104030203" pitchFamily="2" charset="-79"/>
                 <a:cs typeface="Aharoni" panose="02010803020104030203" pitchFamily="2" charset="-79"/>
               </a:rPr>
-              <a:t>Selezione dei preferiti – </a:t>
+              <a:t>Selezione dei preferiti - </a:t>
             </a:r>
             <a:r>
               <a:rPr lang="it-IT" sz="3200" b="1" dirty="0">
                 <a:latin typeface="Aharoni" panose="02010803020104030203" pitchFamily="2" charset="-79"/>
                 <a:cs typeface="Aharoni" panose="02010803020104030203" pitchFamily="2" charset="-79"/>
               </a:rPr>
-              <a:t>Rimozione</a:t>
+              <a:t>Aggiunta</a:t>
             </a:r>
           </a:p>
         </p:txBody>
       </p:sp>
       <p:pic>
         <p:nvPicPr>
-          <p:cNvPr id="5" name="Immagine 4" descr="Immagine che contiene testo&#10;&#10;Descrizione generata automaticamente">
-            <a:extLst>
-              <a:ext uri="{FF2B5EF4-FFF2-40B4-BE49-F238E27FC236}">
-                <a16:creationId xmlns:a16="http://schemas.microsoft.com/office/drawing/2014/main" id="{84AD842D-9ED7-684A-B335-36444842BA99}"/>
+          <p:cNvPr id="4" name="Immagine 3" descr="Immagine che contiene testo&#10;&#10;Descrizione generata automaticamente">
+            <a:extLst>
+              <a:ext uri="{FF2B5EF4-FFF2-40B4-BE49-F238E27FC236}">
+                <a16:creationId xmlns:a16="http://schemas.microsoft.com/office/drawing/2014/main" id="{58ED23DB-59CA-FF40-883F-16A4CFDA0D0F}"/>
               </a:ext>
             </a:extLst>
           </p:cNvPr>
@@ -10133,8 +10431,8 @@
         </p:blipFill>
         <p:spPr>
           <a:xfrm>
-            <a:off x="698500" y="1460500"/>
-            <a:ext cx="5397500" cy="1968500"/>
+            <a:off x="245680" y="1242407"/>
+            <a:ext cx="6355145" cy="4378717"/>
           </a:xfrm>
           <a:prstGeom prst="rect">
             <a:avLst/>
@@ -10143,10 +10441,10 @@
       </p:pic>
       <p:sp>
         <p:nvSpPr>
-          <p:cNvPr id="7" name="CasellaDiTesto 6">
-            <a:extLst>
-              <a:ext uri="{FF2B5EF4-FFF2-40B4-BE49-F238E27FC236}">
-                <a16:creationId xmlns:a16="http://schemas.microsoft.com/office/drawing/2014/main" id="{E7C8A649-64E2-184A-B73C-913D5E320D34}"/>
+          <p:cNvPr id="6" name="CasellaDiTesto 5">
+            <a:extLst>
+              <a:ext uri="{FF2B5EF4-FFF2-40B4-BE49-F238E27FC236}">
+                <a16:creationId xmlns:a16="http://schemas.microsoft.com/office/drawing/2014/main" id="{983D3BE6-AC13-A246-AED9-D6D3538E89C2}"/>
               </a:ext>
             </a:extLst>
           </p:cNvPr>
@@ -10155,8 +10453,8 @@
         </p:nvSpPr>
         <p:spPr>
           <a:xfrm>
-            <a:off x="6243637" y="1460499"/>
-            <a:ext cx="5772151" cy="2308324"/>
+            <a:off x="6810187" y="1343024"/>
+            <a:ext cx="5136133" cy="4247317"/>
           </a:xfrm>
           <a:prstGeom prst="rect">
             <a:avLst/>
@@ -10171,33 +10469,25 @@
           <a:p>
             <a:r>
               <a:rPr lang="it-IT" dirty="0"/>
-              <a:t>Con la funzione </a:t>
+              <a:t>La funzione, per prima cosa, controlla se l’articolo in cui abbiamo cliccato sul div preferiti fa già parte di una lista in cui tengo conto quali articoli sono stati aggiunti nella sezione dei preferiti. Ovviamente se l’articolo non si trova nella lista, entra dentro il blocco else. Nel blocco else viene aggiunto appunto nella lista degli elementi aggiunti e dato che, da specifica, l’articolo deve pur rimanere nella sezione dove ci stanno tutti gli articoli e quindi mi clono l’articolo e, in quest’ultimo,  rimuovo l’evento </a:t>
             </a:r>
             <a:r>
               <a:rPr lang="it-IT" dirty="0" err="1"/>
-              <a:t>removeSezionePreferiti</a:t>
+              <a:t>addSezionePreferiti</a:t>
             </a:r>
             <a:r>
               <a:rPr lang="it-IT" dirty="0"/>
-              <a:t>, come suggerito da titolo, rimuove un elemento che si trova nella sezione preferiti.</a:t>
+              <a:t> mentre aggiungo un nuovo evento «esclusivo» per poterli togliere dalla sezione dei preferiti.</a:t>
             </a:r>
           </a:p>
           <a:p>
             <a:r>
               <a:rPr lang="it-IT" dirty="0"/>
-              <a:t>Per prima cosa vado a rimuovere l’articolo, che è stato usato come «</a:t>
+              <a:t>Appena finito di sistemare il clone, lo metto nella sezione preferiti tramite l’</a:t>
             </a:r>
             <a:r>
               <a:rPr lang="it-IT" dirty="0" err="1"/>
-              <a:t>template</a:t>
-            </a:r>
-            <a:r>
-              <a:rPr lang="it-IT" dirty="0"/>
-              <a:t>» per poter creare il clone da inserire nella sezione preferiti, dalla lista degli elementi che abbiamo aggiunto nei preferiti, e poi elimino l’articolo tramite </a:t>
-            </a:r>
-            <a:r>
-              <a:rPr lang="it-IT" dirty="0" err="1"/>
-              <a:t>removeChild</a:t>
+              <a:t>appendChild</a:t>
             </a:r>
             <a:r>
               <a:rPr lang="it-IT" dirty="0"/>
@@ -10209,7 +10499,7 @@
     </p:spTree>
     <p:extLst>
       <p:ext uri="{BB962C8B-B14F-4D97-AF65-F5344CB8AC3E}">
-        <p14:creationId xmlns:p14="http://schemas.microsoft.com/office/powerpoint/2010/main" val="946688384"/>
+        <p14:creationId xmlns:p14="http://schemas.microsoft.com/office/powerpoint/2010/main" val="4228455434"/>
       </p:ext>
     </p:extLst>
   </p:cSld>
@@ -10251,6 +10541,176 @@
         <p:spPr>
           <a:xfrm>
             <a:off x="777766" y="472966"/>
+            <a:ext cx="8715848" cy="769441"/>
+          </a:xfrm>
+          <a:prstGeom prst="rect">
+            <a:avLst/>
+          </a:prstGeom>
+          <a:noFill/>
+        </p:spPr>
+        <p:txBody>
+          <a:bodyPr wrap="none" rtlCol="0">
+            <a:spAutoFit/>
+          </a:bodyPr>
+          <a:lstStyle/>
+          <a:p>
+            <a:r>
+              <a:rPr lang="it-IT" sz="4400" b="1" dirty="0">
+                <a:latin typeface="Aharoni" panose="02010803020104030203" pitchFamily="2" charset="-79"/>
+                <a:cs typeface="Aharoni" panose="02010803020104030203" pitchFamily="2" charset="-79"/>
+              </a:rPr>
+              <a:t>Selezione dei preferiti – </a:t>
+            </a:r>
+            <a:r>
+              <a:rPr lang="it-IT" sz="3200" b="1" dirty="0">
+                <a:latin typeface="Aharoni" panose="02010803020104030203" pitchFamily="2" charset="-79"/>
+                <a:cs typeface="Aharoni" panose="02010803020104030203" pitchFamily="2" charset="-79"/>
+              </a:rPr>
+              <a:t>Rimozione</a:t>
+            </a:r>
+          </a:p>
+        </p:txBody>
+      </p:sp>
+      <p:pic>
+        <p:nvPicPr>
+          <p:cNvPr id="5" name="Immagine 4" descr="Immagine che contiene testo&#10;&#10;Descrizione generata automaticamente">
+            <a:extLst>
+              <a:ext uri="{FF2B5EF4-FFF2-40B4-BE49-F238E27FC236}">
+                <a16:creationId xmlns:a16="http://schemas.microsoft.com/office/drawing/2014/main" id="{84AD842D-9ED7-684A-B335-36444842BA99}"/>
+              </a:ext>
+            </a:extLst>
+          </p:cNvPr>
+          <p:cNvPicPr>
+            <a:picLocks noChangeAspect="1"/>
+          </p:cNvPicPr>
+          <p:nvPr/>
+        </p:nvPicPr>
+        <p:blipFill>
+          <a:blip r:embed="rId2"/>
+          <a:stretch>
+            <a:fillRect/>
+          </a:stretch>
+        </p:blipFill>
+        <p:spPr>
+          <a:xfrm>
+            <a:off x="698500" y="1460500"/>
+            <a:ext cx="5397500" cy="1968500"/>
+          </a:xfrm>
+          <a:prstGeom prst="rect">
+            <a:avLst/>
+          </a:prstGeom>
+        </p:spPr>
+      </p:pic>
+      <p:sp>
+        <p:nvSpPr>
+          <p:cNvPr id="7" name="CasellaDiTesto 6">
+            <a:extLst>
+              <a:ext uri="{FF2B5EF4-FFF2-40B4-BE49-F238E27FC236}">
+                <a16:creationId xmlns:a16="http://schemas.microsoft.com/office/drawing/2014/main" id="{E7C8A649-64E2-184A-B73C-913D5E320D34}"/>
+              </a:ext>
+            </a:extLst>
+          </p:cNvPr>
+          <p:cNvSpPr txBox="1"/>
+          <p:nvPr/>
+        </p:nvSpPr>
+        <p:spPr>
+          <a:xfrm>
+            <a:off x="6243637" y="1460499"/>
+            <a:ext cx="5772151" cy="2308324"/>
+          </a:xfrm>
+          <a:prstGeom prst="rect">
+            <a:avLst/>
+          </a:prstGeom>
+          <a:noFill/>
+        </p:spPr>
+        <p:txBody>
+          <a:bodyPr wrap="square" rtlCol="0">
+            <a:spAutoFit/>
+          </a:bodyPr>
+          <a:lstStyle/>
+          <a:p>
+            <a:r>
+              <a:rPr lang="it-IT" dirty="0"/>
+              <a:t>Con la funzione </a:t>
+            </a:r>
+            <a:r>
+              <a:rPr lang="it-IT" dirty="0" err="1"/>
+              <a:t>removeSezionePreferiti</a:t>
+            </a:r>
+            <a:r>
+              <a:rPr lang="it-IT" dirty="0"/>
+              <a:t>, come suggerito da titolo, rimuove un elemento che si trova nella sezione preferiti.</a:t>
+            </a:r>
+          </a:p>
+          <a:p>
+            <a:r>
+              <a:rPr lang="it-IT" dirty="0"/>
+              <a:t>Per prima cosa vado a rimuovere l’articolo, che è stato usato come «</a:t>
+            </a:r>
+            <a:r>
+              <a:rPr lang="it-IT" dirty="0" err="1"/>
+              <a:t>template</a:t>
+            </a:r>
+            <a:r>
+              <a:rPr lang="it-IT" dirty="0"/>
+              <a:t>» per poter creare il clone da inserire nella sezione preferiti, dalla lista degli elementi che abbiamo aggiunto nei preferiti, e poi elimino l’articolo tramite </a:t>
+            </a:r>
+            <a:r>
+              <a:rPr lang="it-IT" dirty="0" err="1"/>
+              <a:t>removeChild</a:t>
+            </a:r>
+            <a:r>
+              <a:rPr lang="it-IT" dirty="0"/>
+              <a:t>.</a:t>
+            </a:r>
+          </a:p>
+        </p:txBody>
+      </p:sp>
+    </p:spTree>
+    <p:extLst>
+      <p:ext uri="{BB962C8B-B14F-4D97-AF65-F5344CB8AC3E}">
+        <p14:creationId xmlns:p14="http://schemas.microsoft.com/office/powerpoint/2010/main" val="946688384"/>
+      </p:ext>
+    </p:extLst>
+  </p:cSld>
+  <p:clrMapOvr>
+    <a:masterClrMapping/>
+  </p:clrMapOvr>
+</p:sld>
+</file>
+
+<file path=ppt/slides/slide6.xml><?xml version="1.0" encoding="utf-8"?>
+<p:sld xmlns:a="http://schemas.openxmlformats.org/drawingml/2006/main" xmlns:r="http://schemas.openxmlformats.org/officeDocument/2006/relationships" xmlns:p="http://schemas.openxmlformats.org/presentationml/2006/main">
+  <p:cSld>
+    <p:spTree>
+      <p:nvGrpSpPr>
+        <p:cNvPr id="1" name=""/>
+        <p:cNvGrpSpPr/>
+        <p:nvPr/>
+      </p:nvGrpSpPr>
+      <p:grpSpPr>
+        <a:xfrm>
+          <a:off x="0" y="0"/>
+          <a:ext cx="0" cy="0"/>
+          <a:chOff x="0" y="0"/>
+          <a:chExt cx="0" cy="0"/>
+        </a:xfrm>
+      </p:grpSpPr>
+      <p:sp>
+        <p:nvSpPr>
+          <p:cNvPr id="2" name="CasellaDiTesto 1">
+            <a:extLst>
+              <a:ext uri="{FF2B5EF4-FFF2-40B4-BE49-F238E27FC236}">
+                <a16:creationId xmlns:a16="http://schemas.microsoft.com/office/drawing/2014/main" id="{376D5032-7818-2D43-BCA4-B6F92A338EAB}"/>
+              </a:ext>
+            </a:extLst>
+          </p:cNvPr>
+          <p:cNvSpPr txBox="1"/>
+          <p:nvPr/>
+        </p:nvSpPr>
+        <p:spPr>
+          <a:xfrm>
+            <a:off x="777766" y="472966"/>
             <a:ext cx="11414234" cy="769441"/>
           </a:xfrm>
           <a:prstGeom prst="rect">
@@ -10369,7 +10829,7 @@
 </p:sld>
 </file>
 
-<file path=ppt/slides/slide6.xml><?xml version="1.0" encoding="utf-8"?>
+<file path=ppt/slides/slide7.xml><?xml version="1.0" encoding="utf-8"?>
 <p:sld xmlns:a="http://schemas.openxmlformats.org/drawingml/2006/main" xmlns:r="http://schemas.openxmlformats.org/officeDocument/2006/relationships" xmlns:p="http://schemas.openxmlformats.org/presentationml/2006/main">
   <p:cSld>
     <p:spTree>
@@ -10521,7 +10981,7 @@
 </p:sld>
 </file>
 
-<file path=ppt/slides/slide7.xml><?xml version="1.0" encoding="utf-8"?>
+<file path=ppt/slides/slide8.xml><?xml version="1.0" encoding="utf-8"?>
 <p:sld xmlns:a="http://schemas.openxmlformats.org/drawingml/2006/main" xmlns:r="http://schemas.openxmlformats.org/officeDocument/2006/relationships" xmlns:p="http://schemas.openxmlformats.org/presentationml/2006/main">
   <p:cSld>
     <p:spTree>
@@ -10716,7 +11176,7 @@
 </p:sld>
 </file>
 
-<file path=ppt/slides/slide8.xml><?xml version="1.0" encoding="utf-8"?>
+<file path=ppt/slides/slide9.xml><?xml version="1.0" encoding="utf-8"?>
 <p:sld xmlns:a="http://schemas.openxmlformats.org/drawingml/2006/main" xmlns:r="http://schemas.openxmlformats.org/officeDocument/2006/relationships" xmlns:p="http://schemas.openxmlformats.org/presentationml/2006/main">
   <p:cSld>
     <p:spTree>
@@ -10887,146 +11347,6 @@
     <p:extLst>
       <p:ext uri="{BB962C8B-B14F-4D97-AF65-F5344CB8AC3E}">
         <p14:creationId xmlns:p14="http://schemas.microsoft.com/office/powerpoint/2010/main" val="3816840041"/>
-      </p:ext>
-    </p:extLst>
-  </p:cSld>
-  <p:clrMapOvr>
-    <a:masterClrMapping/>
-  </p:clrMapOvr>
-</p:sld>
-</file>
-
-<file path=ppt/slides/slide9.xml><?xml version="1.0" encoding="utf-8"?>
-<p:sld xmlns:a="http://schemas.openxmlformats.org/drawingml/2006/main" xmlns:r="http://schemas.openxmlformats.org/officeDocument/2006/relationships" xmlns:p="http://schemas.openxmlformats.org/presentationml/2006/main">
-  <p:cSld>
-    <p:spTree>
-      <p:nvGrpSpPr>
-        <p:cNvPr id="1" name=""/>
-        <p:cNvGrpSpPr/>
-        <p:nvPr/>
-      </p:nvGrpSpPr>
-      <p:grpSpPr>
-        <a:xfrm>
-          <a:off x="0" y="0"/>
-          <a:ext cx="0" cy="0"/>
-          <a:chOff x="0" y="0"/>
-          <a:chExt cx="0" cy="0"/>
-        </a:xfrm>
-      </p:grpSpPr>
-      <p:sp>
-        <p:nvSpPr>
-          <p:cNvPr id="2" name="CasellaDiTesto 1">
-            <a:extLst>
-              <a:ext uri="{FF2B5EF4-FFF2-40B4-BE49-F238E27FC236}">
-                <a16:creationId xmlns:a16="http://schemas.microsoft.com/office/drawing/2014/main" id="{376D5032-7818-2D43-BCA4-B6F92A338EAB}"/>
-              </a:ext>
-            </a:extLst>
-          </p:cNvPr>
-          <p:cNvSpPr txBox="1"/>
-          <p:nvPr/>
-        </p:nvSpPr>
-        <p:spPr>
-          <a:xfrm>
-            <a:off x="777766" y="472966"/>
-            <a:ext cx="11414234" cy="769441"/>
-          </a:xfrm>
-          <a:prstGeom prst="rect">
-            <a:avLst/>
-          </a:prstGeom>
-          <a:noFill/>
-        </p:spPr>
-        <p:txBody>
-          <a:bodyPr wrap="square" rtlCol="0">
-            <a:spAutoFit/>
-          </a:bodyPr>
-          <a:lstStyle/>
-          <a:p>
-            <a:r>
-              <a:rPr lang="it-IT" sz="4400" b="1" dirty="0">
-                <a:latin typeface="Aharoni" panose="02010803020104030203" pitchFamily="2" charset="-79"/>
-                <a:cs typeface="Aharoni" panose="02010803020104030203" pitchFamily="2" charset="-79"/>
-              </a:rPr>
-              <a:t>Barra di ricerca - </a:t>
-            </a:r>
-            <a:r>
-              <a:rPr lang="it-IT" sz="3200" b="1" dirty="0">
-                <a:latin typeface="Aharoni" panose="02010803020104030203" pitchFamily="2" charset="-79"/>
-                <a:cs typeface="Aharoni" panose="02010803020104030203" pitchFamily="2" charset="-79"/>
-              </a:rPr>
-              <a:t>Ripristino</a:t>
-            </a:r>
-          </a:p>
-        </p:txBody>
-      </p:sp>
-      <p:pic>
-        <p:nvPicPr>
-          <p:cNvPr id="6" name="Immagine 5" descr="Immagine che contiene testo&#10;&#10;Descrizione generata automaticamente">
-            <a:extLst>
-              <a:ext uri="{FF2B5EF4-FFF2-40B4-BE49-F238E27FC236}">
-                <a16:creationId xmlns:a16="http://schemas.microsoft.com/office/drawing/2014/main" id="{2B9009F9-D549-3B48-9B93-6E69D60CC772}"/>
-              </a:ext>
-            </a:extLst>
-          </p:cNvPr>
-          <p:cNvPicPr>
-            <a:picLocks noChangeAspect="1"/>
-          </p:cNvPicPr>
-          <p:nvPr/>
-        </p:nvPicPr>
-        <p:blipFill>
-          <a:blip r:embed="rId2"/>
-          <a:stretch>
-            <a:fillRect/>
-          </a:stretch>
-        </p:blipFill>
-        <p:spPr>
-          <a:xfrm>
-            <a:off x="377716" y="1482228"/>
-            <a:ext cx="6527800" cy="1587500"/>
-          </a:xfrm>
-          <a:prstGeom prst="rect">
-            <a:avLst/>
-          </a:prstGeom>
-        </p:spPr>
-      </p:pic>
-      <p:sp>
-        <p:nvSpPr>
-          <p:cNvPr id="7" name="CasellaDiTesto 6">
-            <a:extLst>
-              <a:ext uri="{FF2B5EF4-FFF2-40B4-BE49-F238E27FC236}">
-                <a16:creationId xmlns:a16="http://schemas.microsoft.com/office/drawing/2014/main" id="{6A47DF3F-99D3-F345-84F6-72FAFEFAF671}"/>
-              </a:ext>
-            </a:extLst>
-          </p:cNvPr>
-          <p:cNvSpPr txBox="1"/>
-          <p:nvPr/>
-        </p:nvSpPr>
-        <p:spPr>
-          <a:xfrm>
-            <a:off x="185738" y="3449635"/>
-            <a:ext cx="11772900" cy="369332"/>
-          </a:xfrm>
-          <a:prstGeom prst="rect">
-            <a:avLst/>
-          </a:prstGeom>
-          <a:noFill/>
-        </p:spPr>
-        <p:txBody>
-          <a:bodyPr wrap="square" rtlCol="0">
-            <a:spAutoFit/>
-          </a:bodyPr>
-          <a:lstStyle/>
-          <a:p>
-            <a:r>
-              <a:rPr lang="it-IT" dirty="0"/>
-              <a:t>Un semplice script in cui mi ripristina gli elementi nella loro posizione «naturale»</a:t>
-            </a:r>
-          </a:p>
-        </p:txBody>
-      </p:sp>
-    </p:spTree>
-    <p:extLst>
-      <p:ext uri="{BB962C8B-B14F-4D97-AF65-F5344CB8AC3E}">
-        <p14:creationId xmlns:p14="http://schemas.microsoft.com/office/powerpoint/2010/main" val="1185359177"/>
       </p:ext>
     </p:extLst>
   </p:cSld>

</xml_diff>